<commit_message>
More Sprint 1 and slide tweaks
</commit_message>
<xml_diff>
--- a/Sprint1/EdaWorkshop_Sprint1.pptx
+++ b/Sprint1/EdaWorkshop_Sprint1.pptx
@@ -6,14 +6,16 @@
   </p:sldMasterIdLst>
   <p:sldIdLst>
     <p:sldId id="269" r:id="rId2"/>
-    <p:sldId id="271" r:id="rId3"/>
-    <p:sldId id="272" r:id="rId4"/>
-    <p:sldId id="314" r:id="rId5"/>
-    <p:sldId id="273" r:id="rId6"/>
-    <p:sldId id="274" r:id="rId7"/>
-    <p:sldId id="275" r:id="rId8"/>
-    <p:sldId id="276" r:id="rId9"/>
-    <p:sldId id="277" r:id="rId10"/>
+    <p:sldId id="316" r:id="rId3"/>
+    <p:sldId id="271" r:id="rId4"/>
+    <p:sldId id="272" r:id="rId5"/>
+    <p:sldId id="314" r:id="rId6"/>
+    <p:sldId id="273" r:id="rId7"/>
+    <p:sldId id="274" r:id="rId8"/>
+    <p:sldId id="275" r:id="rId9"/>
+    <p:sldId id="276" r:id="rId10"/>
+    <p:sldId id="315" r:id="rId11"/>
+    <p:sldId id="277" r:id="rId12"/>
   </p:sldIdLst>
   <p:sldSz cx="12192000" cy="6858000"/>
   <p:notesSz cx="6858000" cy="9144000"/>
@@ -251,7 +253,7 @@
           <a:p>
             <a:fld id="{0B5D536D-AE8C-4EAC-8CEB-B18A64A144B4}" type="datetimeFigureOut">
               <a:rPr lang="en-US" smtClean="0"/>
-              <a:t>9/18/2021</a:t>
+              <a:t>9/19/2021</a:t>
             </a:fld>
             <a:endParaRPr lang="en-US"/>
           </a:p>
@@ -421,7 +423,7 @@
           <a:p>
             <a:fld id="{0B5D536D-AE8C-4EAC-8CEB-B18A64A144B4}" type="datetimeFigureOut">
               <a:rPr lang="en-US" smtClean="0"/>
-              <a:t>9/18/2021</a:t>
+              <a:t>9/19/2021</a:t>
             </a:fld>
             <a:endParaRPr lang="en-US"/>
           </a:p>
@@ -601,7 +603,7 @@
           <a:p>
             <a:fld id="{0B5D536D-AE8C-4EAC-8CEB-B18A64A144B4}" type="datetimeFigureOut">
               <a:rPr lang="en-US" smtClean="0"/>
-              <a:t>9/18/2021</a:t>
+              <a:t>9/19/2021</a:t>
             </a:fld>
             <a:endParaRPr lang="en-US"/>
           </a:p>
@@ -771,7 +773,7 @@
           <a:p>
             <a:fld id="{0B5D536D-AE8C-4EAC-8CEB-B18A64A144B4}" type="datetimeFigureOut">
               <a:rPr lang="en-US" smtClean="0"/>
-              <a:t>9/18/2021</a:t>
+              <a:t>9/19/2021</a:t>
             </a:fld>
             <a:endParaRPr lang="en-US"/>
           </a:p>
@@ -1017,7 +1019,7 @@
           <a:p>
             <a:fld id="{0B5D536D-AE8C-4EAC-8CEB-B18A64A144B4}" type="datetimeFigureOut">
               <a:rPr lang="en-US" smtClean="0"/>
-              <a:t>9/18/2021</a:t>
+              <a:t>9/19/2021</a:t>
             </a:fld>
             <a:endParaRPr lang="en-US"/>
           </a:p>
@@ -1249,7 +1251,7 @@
           <a:p>
             <a:fld id="{0B5D536D-AE8C-4EAC-8CEB-B18A64A144B4}" type="datetimeFigureOut">
               <a:rPr lang="en-US" smtClean="0"/>
-              <a:t>9/18/2021</a:t>
+              <a:t>9/19/2021</a:t>
             </a:fld>
             <a:endParaRPr lang="en-US"/>
           </a:p>
@@ -1616,7 +1618,7 @@
           <a:p>
             <a:fld id="{0B5D536D-AE8C-4EAC-8CEB-B18A64A144B4}" type="datetimeFigureOut">
               <a:rPr lang="en-US" smtClean="0"/>
-              <a:t>9/18/2021</a:t>
+              <a:t>9/19/2021</a:t>
             </a:fld>
             <a:endParaRPr lang="en-US"/>
           </a:p>
@@ -1734,7 +1736,7 @@
           <a:p>
             <a:fld id="{0B5D536D-AE8C-4EAC-8CEB-B18A64A144B4}" type="datetimeFigureOut">
               <a:rPr lang="en-US" smtClean="0"/>
-              <a:t>9/18/2021</a:t>
+              <a:t>9/19/2021</a:t>
             </a:fld>
             <a:endParaRPr lang="en-US"/>
           </a:p>
@@ -1829,7 +1831,7 @@
           <a:p>
             <a:fld id="{0B5D536D-AE8C-4EAC-8CEB-B18A64A144B4}" type="datetimeFigureOut">
               <a:rPr lang="en-US" smtClean="0"/>
-              <a:t>9/18/2021</a:t>
+              <a:t>9/19/2021</a:t>
             </a:fld>
             <a:endParaRPr lang="en-US"/>
           </a:p>
@@ -2106,7 +2108,7 @@
           <a:p>
             <a:fld id="{0B5D536D-AE8C-4EAC-8CEB-B18A64A144B4}" type="datetimeFigureOut">
               <a:rPr lang="en-US" smtClean="0"/>
-              <a:t>9/18/2021</a:t>
+              <a:t>9/19/2021</a:t>
             </a:fld>
             <a:endParaRPr lang="en-US"/>
           </a:p>
@@ -2359,7 +2361,7 @@
           <a:p>
             <a:fld id="{0B5D536D-AE8C-4EAC-8CEB-B18A64A144B4}" type="datetimeFigureOut">
               <a:rPr lang="en-US" smtClean="0"/>
-              <a:t>9/18/2021</a:t>
+              <a:t>9/19/2021</a:t>
             </a:fld>
             <a:endParaRPr lang="en-US"/>
           </a:p>
@@ -2572,7 +2574,7 @@
           <a:p>
             <a:fld id="{0B5D536D-AE8C-4EAC-8CEB-B18A64A144B4}" type="datetimeFigureOut">
               <a:rPr lang="en-US" smtClean="0"/>
-              <a:t>9/18/2021</a:t>
+              <a:t>9/19/2021</a:t>
             </a:fld>
             <a:endParaRPr lang="en-US"/>
           </a:p>
@@ -3017,15 +3019,7 @@
           <a:p>
             <a:r>
               <a:rPr lang="en-US" dirty="0" smtClean="0"/>
-              <a:t>GOAL: Publish incoming requests to </a:t>
-            </a:r>
-            <a:r>
-              <a:rPr lang="en-US" dirty="0" smtClean="0"/>
-              <a:t>the utilization </a:t>
-            </a:r>
-            <a:r>
-              <a:rPr lang="en-US" dirty="0" smtClean="0"/>
-              <a:t>management platform</a:t>
+              <a:t>GOAL: Publish incoming requests to the utilization management platform</a:t>
             </a:r>
             <a:endParaRPr lang="en-US" b="1" dirty="0"/>
           </a:p>
@@ -3035,6 +3029,337 @@
     <p:extLst>
       <p:ext uri="{BB962C8B-B14F-4D97-AF65-F5344CB8AC3E}">
         <p14:creationId xmlns:p14="http://schemas.microsoft.com/office/powerpoint/2010/main" val="95073917"/>
+      </p:ext>
+    </p:extLst>
+  </p:cSld>
+  <p:clrMapOvr>
+    <a:masterClrMapping/>
+  </p:clrMapOvr>
+</p:sld>
+</file>
+
+<file path=ppt/slides/slide10.xml><?xml version="1.0" encoding="utf-8"?>
+<p:sld xmlns:a="http://schemas.openxmlformats.org/drawingml/2006/main" xmlns:r="http://schemas.openxmlformats.org/officeDocument/2006/relationships" xmlns:p="http://schemas.openxmlformats.org/presentationml/2006/main">
+  <p:cSld>
+    <p:spTree>
+      <p:nvGrpSpPr>
+        <p:cNvPr id="1" name=""/>
+        <p:cNvGrpSpPr/>
+        <p:nvPr/>
+      </p:nvGrpSpPr>
+      <p:grpSpPr>
+        <a:xfrm>
+          <a:off x="0" y="0"/>
+          <a:ext cx="0" cy="0"/>
+          <a:chOff x="0" y="0"/>
+          <a:chExt cx="0" cy="0"/>
+        </a:xfrm>
+      </p:grpSpPr>
+      <p:sp>
+        <p:nvSpPr>
+          <p:cNvPr id="2" name="Title 1"/>
+          <p:cNvSpPr>
+            <a:spLocks noGrp="1"/>
+          </p:cNvSpPr>
+          <p:nvPr>
+            <p:ph type="title"/>
+          </p:nvPr>
+        </p:nvSpPr>
+        <p:spPr/>
+        <p:txBody>
+          <a:bodyPr/>
+          <a:lstStyle/>
+          <a:p>
+            <a:r>
+              <a:rPr lang="en-US" dirty="0"/>
+              <a:t>T</a:t>
+            </a:r>
+            <a:r>
+              <a:rPr lang="en-US" dirty="0" smtClean="0"/>
+              <a:t>ask </a:t>
+            </a:r>
+            <a:r>
+              <a:rPr lang="en-US" dirty="0" smtClean="0"/>
+              <a:t>1-3: Deploy to Azure</a:t>
+            </a:r>
+            <a:endParaRPr lang="en-US" dirty="0"/>
+          </a:p>
+        </p:txBody>
+      </p:sp>
+      <p:sp>
+        <p:nvSpPr>
+          <p:cNvPr id="3" name="Content Placeholder 2"/>
+          <p:cNvSpPr>
+            <a:spLocks noGrp="1"/>
+          </p:cNvSpPr>
+          <p:nvPr>
+            <p:ph idx="1"/>
+          </p:nvPr>
+        </p:nvSpPr>
+        <p:spPr/>
+        <p:txBody>
+          <a:bodyPr>
+            <a:normAutofit fontScale="92500" lnSpcReduction="20000"/>
+          </a:bodyPr>
+          <a:lstStyle/>
+          <a:p>
+            <a:r>
+              <a:rPr lang="en-US" dirty="0" smtClean="0"/>
+              <a:t>Publish from Visual Studio to Azure</a:t>
+            </a:r>
+          </a:p>
+          <a:p>
+            <a:endParaRPr lang="en-US" dirty="0"/>
+          </a:p>
+          <a:p>
+            <a:r>
+              <a:rPr lang="en-US" dirty="0" smtClean="0"/>
+              <a:t>Create Profile</a:t>
+            </a:r>
+          </a:p>
+          <a:p>
+            <a:pPr lvl="1"/>
+            <a:r>
+              <a:rPr lang="en-US" dirty="0" smtClean="0"/>
+              <a:t>Requires Azure credentials</a:t>
+            </a:r>
+            <a:endParaRPr lang="en-US" dirty="0" smtClean="0"/>
+          </a:p>
+          <a:p>
+            <a:pPr lvl="1"/>
+            <a:r>
+              <a:rPr lang="en-US" dirty="0" smtClean="0"/>
+              <a:t>Azure Windows / Linux</a:t>
+            </a:r>
+          </a:p>
+          <a:p>
+            <a:pPr lvl="1"/>
+            <a:r>
+              <a:rPr lang="en-US" dirty="0"/>
+              <a:t>Double check Account, Subscription, Resource Group, and Location</a:t>
+            </a:r>
+          </a:p>
+          <a:p>
+            <a:pPr lvl="1"/>
+            <a:r>
+              <a:rPr lang="en-US" dirty="0" smtClean="0"/>
+              <a:t>New Function App</a:t>
+            </a:r>
+          </a:p>
+          <a:p>
+            <a:pPr lvl="1"/>
+            <a:r>
+              <a:rPr lang="en-US" dirty="0" smtClean="0"/>
+              <a:t>New Storage Account</a:t>
+            </a:r>
+          </a:p>
+          <a:p>
+            <a:endParaRPr lang="en-US" dirty="0"/>
+          </a:p>
+          <a:p>
+            <a:r>
+              <a:rPr lang="en-US" dirty="0" smtClean="0"/>
+              <a:t>Publish</a:t>
+            </a:r>
+          </a:p>
+          <a:p>
+            <a:endParaRPr lang="en-US" dirty="0"/>
+          </a:p>
+          <a:p>
+            <a:r>
+              <a:rPr lang="en-US" dirty="0" smtClean="0"/>
+              <a:t>Ensure messages making it to </a:t>
+            </a:r>
+            <a:r>
+              <a:rPr lang="en-US" i="1" dirty="0" err="1" smtClean="0"/>
+              <a:t>receivedrequest</a:t>
+            </a:r>
+            <a:r>
+              <a:rPr lang="en-US" dirty="0" smtClean="0"/>
+              <a:t> hub</a:t>
+            </a:r>
+            <a:endParaRPr lang="en-US" dirty="0" smtClean="0"/>
+          </a:p>
+        </p:txBody>
+      </p:sp>
+      <p:pic>
+        <p:nvPicPr>
+          <p:cNvPr id="4" name="Picture 3"/>
+          <p:cNvPicPr>
+            <a:picLocks noChangeAspect="1"/>
+          </p:cNvPicPr>
+          <p:nvPr/>
+        </p:nvPicPr>
+        <p:blipFill>
+          <a:blip r:embed="rId2" cstate="print">
+            <a:extLst>
+              <a:ext uri="{28A0092B-C50C-407E-A947-70E740481C1C}">
+                <a14:useLocalDpi xmlns:a14="http://schemas.microsoft.com/office/drawing/2010/main" val="0"/>
+              </a:ext>
+            </a:extLst>
+          </a:blip>
+          <a:stretch>
+            <a:fillRect/>
+          </a:stretch>
+        </p:blipFill>
+        <p:spPr>
+          <a:xfrm>
+            <a:off x="9135291" y="292047"/>
+            <a:ext cx="2455817" cy="1381224"/>
+          </a:xfrm>
+          <a:prstGeom prst="rect">
+            <a:avLst/>
+          </a:prstGeom>
+        </p:spPr>
+      </p:pic>
+    </p:spTree>
+    <p:extLst>
+      <p:ext uri="{BB962C8B-B14F-4D97-AF65-F5344CB8AC3E}">
+        <p14:creationId xmlns:p14="http://schemas.microsoft.com/office/powerpoint/2010/main" val="2381673536"/>
+      </p:ext>
+    </p:extLst>
+  </p:cSld>
+  <p:clrMapOvr>
+    <a:masterClrMapping/>
+  </p:clrMapOvr>
+</p:sld>
+</file>
+
+<file path=ppt/slides/slide11.xml><?xml version="1.0" encoding="utf-8"?>
+<p:sld xmlns:a="http://schemas.openxmlformats.org/drawingml/2006/main" xmlns:r="http://schemas.openxmlformats.org/officeDocument/2006/relationships" xmlns:p="http://schemas.openxmlformats.org/presentationml/2006/main">
+  <p:cSld>
+    <p:spTree>
+      <p:nvGrpSpPr>
+        <p:cNvPr id="1" name=""/>
+        <p:cNvGrpSpPr/>
+        <p:nvPr/>
+      </p:nvGrpSpPr>
+      <p:grpSpPr>
+        <a:xfrm>
+          <a:off x="0" y="0"/>
+          <a:ext cx="0" cy="0"/>
+          <a:chOff x="0" y="0"/>
+          <a:chExt cx="0" cy="0"/>
+        </a:xfrm>
+      </p:grpSpPr>
+      <p:sp>
+        <p:nvSpPr>
+          <p:cNvPr id="2" name="Title 1"/>
+          <p:cNvSpPr>
+            <a:spLocks noGrp="1"/>
+          </p:cNvSpPr>
+          <p:nvPr>
+            <p:ph type="title"/>
+          </p:nvPr>
+        </p:nvSpPr>
+        <p:spPr/>
+        <p:txBody>
+          <a:bodyPr/>
+          <a:lstStyle/>
+          <a:p>
+            <a:r>
+              <a:rPr lang="en-US" dirty="0" smtClean="0"/>
+              <a:t>Sprint 1: Retrospective</a:t>
+            </a:r>
+            <a:endParaRPr lang="en-US" dirty="0"/>
+          </a:p>
+        </p:txBody>
+      </p:sp>
+      <p:sp>
+        <p:nvSpPr>
+          <p:cNvPr id="3" name="Content Placeholder 2"/>
+          <p:cNvSpPr>
+            <a:spLocks noGrp="1"/>
+          </p:cNvSpPr>
+          <p:nvPr>
+            <p:ph idx="1"/>
+          </p:nvPr>
+        </p:nvSpPr>
+        <p:spPr/>
+        <p:txBody>
+          <a:bodyPr>
+            <a:normAutofit/>
+          </a:bodyPr>
+          <a:lstStyle/>
+          <a:p>
+            <a:r>
+              <a:rPr lang="en-US" dirty="0" smtClean="0"/>
+              <a:t>We have the beginning of our utilization management platform</a:t>
+            </a:r>
+          </a:p>
+          <a:p>
+            <a:pPr lvl="1"/>
+            <a:r>
+              <a:rPr lang="en-US" dirty="0" smtClean="0"/>
+              <a:t>Incoming requests are available to any platform components</a:t>
+            </a:r>
+          </a:p>
+          <a:p>
+            <a:endParaRPr lang="en-US" dirty="0" smtClean="0"/>
+          </a:p>
+          <a:p>
+            <a:r>
+              <a:rPr lang="en-US" dirty="0" smtClean="0"/>
+              <a:t>We are taking advantage of asynchronous messaging</a:t>
+            </a:r>
+          </a:p>
+          <a:p>
+            <a:pPr lvl="1"/>
+            <a:r>
+              <a:rPr lang="en-US" dirty="0" smtClean="0"/>
+              <a:t>Publishing requests with little concern for who will consume them or how many consumers there will be</a:t>
+            </a:r>
+          </a:p>
+          <a:p>
+            <a:endParaRPr lang="en-US" dirty="0" smtClean="0"/>
+          </a:p>
+          <a:p>
+            <a:r>
+              <a:rPr lang="en-US" dirty="0" smtClean="0"/>
+              <a:t>Everything about the platform is </a:t>
+            </a:r>
+            <a:r>
+              <a:rPr lang="en-US" dirty="0" smtClean="0"/>
+              <a:t>scalable</a:t>
+            </a:r>
+            <a:endParaRPr lang="en-US" dirty="0" smtClean="0"/>
+          </a:p>
+        </p:txBody>
+      </p:sp>
+      <p:pic>
+        <p:nvPicPr>
+          <p:cNvPr id="4" name="Picture 3"/>
+          <p:cNvPicPr>
+            <a:picLocks noChangeAspect="1"/>
+          </p:cNvPicPr>
+          <p:nvPr/>
+        </p:nvPicPr>
+        <p:blipFill>
+          <a:blip r:embed="rId2" cstate="print">
+            <a:extLst>
+              <a:ext uri="{28A0092B-C50C-407E-A947-70E740481C1C}">
+                <a14:useLocalDpi xmlns:a14="http://schemas.microsoft.com/office/drawing/2010/main" val="0"/>
+              </a:ext>
+            </a:extLst>
+          </a:blip>
+          <a:stretch>
+            <a:fillRect/>
+          </a:stretch>
+        </p:blipFill>
+        <p:spPr>
+          <a:xfrm>
+            <a:off x="9135291" y="292047"/>
+            <a:ext cx="2455817" cy="1381224"/>
+          </a:xfrm>
+          <a:prstGeom prst="rect">
+            <a:avLst/>
+          </a:prstGeom>
+        </p:spPr>
+      </p:pic>
+    </p:spTree>
+    <p:extLst>
+      <p:ext uri="{BB962C8B-B14F-4D97-AF65-F5344CB8AC3E}">
+        <p14:creationId xmlns:p14="http://schemas.microsoft.com/office/powerpoint/2010/main" val="1524408480"/>
       </p:ext>
     </p:extLst>
   </p:cSld>
@@ -3063,6 +3388,98 @@
       </p:grpSpPr>
       <p:sp>
         <p:nvSpPr>
+          <p:cNvPr id="4" name="Title 3"/>
+          <p:cNvSpPr>
+            <a:spLocks noGrp="1"/>
+          </p:cNvSpPr>
+          <p:nvPr>
+            <p:ph type="title"/>
+          </p:nvPr>
+        </p:nvSpPr>
+        <p:spPr/>
+        <p:txBody>
+          <a:bodyPr/>
+          <a:lstStyle/>
+          <a:p>
+            <a:r>
+              <a:rPr lang="en-US" dirty="0" smtClean="0"/>
+              <a:t>***TODO</a:t>
+            </a:r>
+            <a:endParaRPr lang="en-US" dirty="0"/>
+          </a:p>
+        </p:txBody>
+      </p:sp>
+      <p:sp>
+        <p:nvSpPr>
+          <p:cNvPr id="5" name="Content Placeholder 4"/>
+          <p:cNvSpPr>
+            <a:spLocks noGrp="1"/>
+          </p:cNvSpPr>
+          <p:nvPr>
+            <p:ph idx="1"/>
+          </p:nvPr>
+        </p:nvSpPr>
+        <p:spPr/>
+        <p:txBody>
+          <a:bodyPr/>
+          <a:lstStyle/>
+          <a:p>
+            <a:r>
+              <a:rPr lang="en-US" dirty="0" smtClean="0"/>
+              <a:t>Do we need to ensure Azure emulator installed?</a:t>
+            </a:r>
+          </a:p>
+          <a:p>
+            <a:r>
+              <a:rPr lang="en-US" dirty="0" smtClean="0"/>
+              <a:t>Add completed solution </a:t>
+            </a:r>
+            <a:r>
+              <a:rPr lang="en-US" smtClean="0"/>
+              <a:t>to sprint 2</a:t>
+            </a:r>
+          </a:p>
+          <a:p>
+            <a:r>
+              <a:rPr lang="en-US" dirty="0" smtClean="0"/>
+              <a:t>Create ARM templates for sprint 2</a:t>
+            </a:r>
+            <a:endParaRPr lang="en-US" dirty="0"/>
+          </a:p>
+        </p:txBody>
+      </p:sp>
+    </p:spTree>
+    <p:extLst>
+      <p:ext uri="{BB962C8B-B14F-4D97-AF65-F5344CB8AC3E}">
+        <p14:creationId xmlns:p14="http://schemas.microsoft.com/office/powerpoint/2010/main" val="3809530939"/>
+      </p:ext>
+    </p:extLst>
+  </p:cSld>
+  <p:clrMapOvr>
+    <a:masterClrMapping/>
+  </p:clrMapOvr>
+</p:sld>
+</file>
+
+<file path=ppt/slides/slide3.xml><?xml version="1.0" encoding="utf-8"?>
+<p:sld xmlns:a="http://schemas.openxmlformats.org/drawingml/2006/main" xmlns:r="http://schemas.openxmlformats.org/officeDocument/2006/relationships" xmlns:p="http://schemas.openxmlformats.org/presentationml/2006/main">
+  <p:cSld>
+    <p:spTree>
+      <p:nvGrpSpPr>
+        <p:cNvPr id="1" name=""/>
+        <p:cNvGrpSpPr/>
+        <p:nvPr/>
+      </p:nvGrpSpPr>
+      <p:grpSpPr>
+        <a:xfrm>
+          <a:off x="0" y="0"/>
+          <a:ext cx="0" cy="0"/>
+          <a:chOff x="0" y="0"/>
+          <a:chExt cx="0" cy="0"/>
+        </a:xfrm>
+      </p:grpSpPr>
+      <p:sp>
+        <p:nvSpPr>
           <p:cNvPr id="2" name="Title 1"/>
           <p:cNvSpPr>
             <a:spLocks noGrp="1"/>
@@ -3181,13 +3598,8 @@
             </a:pPr>
             <a:r>
               <a:rPr lang="en-US" dirty="0" smtClean="0"/>
-              <a:t>System must be able to receive up to 10,000 incoming requests per </a:t>
-            </a:r>
-            <a:r>
-              <a:rPr lang="en-US" dirty="0" smtClean="0"/>
-              <a:t>minute</a:t>
-            </a:r>
-            <a:endParaRPr lang="en-US" dirty="0" smtClean="0"/>
+              <a:t>System must be able to receive up to 10,000 incoming requests per minute</a:t>
+            </a:r>
           </a:p>
         </p:txBody>
       </p:sp>
@@ -3234,7 +3646,7 @@
 </p:sld>
 </file>
 
-<file path=ppt/slides/slide3.xml><?xml version="1.0" encoding="utf-8"?>
+<file path=ppt/slides/slide4.xml><?xml version="1.0" encoding="utf-8"?>
 <p:sld xmlns:a="http://schemas.openxmlformats.org/drawingml/2006/main" xmlns:r="http://schemas.openxmlformats.org/officeDocument/2006/relationships" xmlns:p="http://schemas.openxmlformats.org/presentationml/2006/main">
   <p:cSld>
     <p:spTree>
@@ -3370,7 +3782,7 @@
 </p:sld>
 </file>
 
-<file path=ppt/slides/slide4.xml><?xml version="1.0" encoding="utf-8"?>
+<file path=ppt/slides/slide5.xml><?xml version="1.0" encoding="utf-8"?>
 <p:sld xmlns:a="http://schemas.openxmlformats.org/drawingml/2006/main" xmlns:r="http://schemas.openxmlformats.org/officeDocument/2006/relationships" xmlns:p="http://schemas.openxmlformats.org/presentationml/2006/main">
   <p:cSld>
     <p:spTree>
@@ -3503,7 +3915,7 @@
 </p:sld>
 </file>
 
-<file path=ppt/slides/slide5.xml><?xml version="1.0" encoding="utf-8"?>
+<file path=ppt/slides/slide6.xml><?xml version="1.0" encoding="utf-8"?>
 <p:sld xmlns:a="http://schemas.openxmlformats.org/drawingml/2006/main" xmlns:r="http://schemas.openxmlformats.org/officeDocument/2006/relationships" xmlns:p="http://schemas.openxmlformats.org/presentationml/2006/main">
   <p:cSld>
     <p:spTree>
@@ -3537,11 +3949,7 @@
           <a:p>
             <a:r>
               <a:rPr lang="en-US" dirty="0" smtClean="0"/>
-              <a:t>Message Bus: Azure </a:t>
-            </a:r>
-            <a:r>
-              <a:rPr lang="en-US" dirty="0" smtClean="0"/>
-              <a:t>Event Hub</a:t>
+              <a:t>Message Bus: Azure Event Hub</a:t>
             </a:r>
             <a:endParaRPr lang="en-US" dirty="0"/>
           </a:p>
@@ -3644,7 +4052,6 @@
               <a:rPr lang="en-US" dirty="0" smtClean="0"/>
               <a:t>Publisher (i.e. producer)</a:t>
             </a:r>
-            <a:endParaRPr lang="en-US" dirty="0" smtClean="0"/>
           </a:p>
           <a:p>
             <a:pPr lvl="1"/>
@@ -3652,7 +4059,6 @@
               <a:rPr lang="en-US" dirty="0" smtClean="0"/>
               <a:t>Consumer (i.e. subscriber)</a:t>
             </a:r>
-            <a:endParaRPr lang="en-US" dirty="0" smtClean="0"/>
           </a:p>
         </p:txBody>
       </p:sp>
@@ -3693,191 +4099,6 @@
 </p:sld>
 </file>
 
-<file path=ppt/slides/slide6.xml><?xml version="1.0" encoding="utf-8"?>
-<p:sld xmlns:a="http://schemas.openxmlformats.org/drawingml/2006/main" xmlns:r="http://schemas.openxmlformats.org/officeDocument/2006/relationships" xmlns:p="http://schemas.openxmlformats.org/presentationml/2006/main">
-  <p:cSld>
-    <p:spTree>
-      <p:nvGrpSpPr>
-        <p:cNvPr id="1" name=""/>
-        <p:cNvGrpSpPr/>
-        <p:nvPr/>
-      </p:nvGrpSpPr>
-      <p:grpSpPr>
-        <a:xfrm>
-          <a:off x="0" y="0"/>
-          <a:ext cx="0" cy="0"/>
-          <a:chOff x="0" y="0"/>
-          <a:chExt cx="0" cy="0"/>
-        </a:xfrm>
-      </p:grpSpPr>
-      <p:sp>
-        <p:nvSpPr>
-          <p:cNvPr id="2" name="Title 1"/>
-          <p:cNvSpPr>
-            <a:spLocks noGrp="1"/>
-          </p:cNvSpPr>
-          <p:nvPr>
-            <p:ph type="title"/>
-          </p:nvPr>
-        </p:nvSpPr>
-        <p:spPr/>
-        <p:txBody>
-          <a:bodyPr/>
-          <a:lstStyle/>
-          <a:p>
-            <a:r>
-              <a:rPr lang="en-US" dirty="0" smtClean="0"/>
-              <a:t>Provider Transfer Service: Azure </a:t>
-            </a:r>
-            <a:r>
-              <a:rPr lang="en-US" dirty="0" smtClean="0"/>
-              <a:t>Function</a:t>
-            </a:r>
-            <a:endParaRPr lang="en-US" dirty="0"/>
-          </a:p>
-        </p:txBody>
-      </p:sp>
-      <p:sp>
-        <p:nvSpPr>
-          <p:cNvPr id="3" name="Content Placeholder 2"/>
-          <p:cNvSpPr>
-            <a:spLocks noGrp="1"/>
-          </p:cNvSpPr>
-          <p:nvPr>
-            <p:ph idx="1"/>
-          </p:nvPr>
-        </p:nvSpPr>
-        <p:spPr/>
-        <p:txBody>
-          <a:bodyPr>
-            <a:normAutofit fontScale="62500" lnSpcReduction="20000"/>
-          </a:bodyPr>
-          <a:lstStyle/>
-          <a:p>
-            <a:r>
-              <a:rPr lang="en-US" dirty="0" smtClean="0"/>
-              <a:t>Azure’s event-driven, </a:t>
-            </a:r>
-            <a:r>
-              <a:rPr lang="en-US" dirty="0" err="1" smtClean="0"/>
-              <a:t>serverless</a:t>
-            </a:r>
-            <a:r>
-              <a:rPr lang="en-US" dirty="0" smtClean="0"/>
-              <a:t> compute option</a:t>
-            </a:r>
-          </a:p>
-          <a:p>
-            <a:endParaRPr lang="en-US" dirty="0" smtClean="0"/>
-          </a:p>
-          <a:p>
-            <a:r>
-              <a:rPr lang="en-US" dirty="0" smtClean="0"/>
-              <a:t>Automatically scales – up to 200 parallel instances</a:t>
-            </a:r>
-          </a:p>
-          <a:p>
-            <a:endParaRPr lang="en-US" dirty="0" smtClean="0"/>
-          </a:p>
-          <a:p>
-            <a:r>
-              <a:rPr lang="en-US" dirty="0" smtClean="0"/>
-              <a:t>Possible triggers</a:t>
-            </a:r>
-          </a:p>
-          <a:p>
-            <a:pPr lvl="1"/>
-            <a:r>
-              <a:rPr lang="en-US" dirty="0" smtClean="0"/>
-              <a:t>HTTP call</a:t>
-            </a:r>
-          </a:p>
-          <a:p>
-            <a:pPr lvl="1"/>
-            <a:r>
-              <a:rPr lang="en-US" dirty="0" smtClean="0"/>
-              <a:t>Timer</a:t>
-            </a:r>
-          </a:p>
-          <a:p>
-            <a:pPr lvl="1"/>
-            <a:r>
-              <a:rPr lang="en-US" dirty="0" smtClean="0"/>
-              <a:t>Message arrived / event occurred</a:t>
-            </a:r>
-          </a:p>
-          <a:p>
-            <a:pPr lvl="1"/>
-            <a:r>
-              <a:rPr lang="en-US" dirty="0" smtClean="0"/>
-              <a:t>Database record created, updated, or deleted</a:t>
-            </a:r>
-          </a:p>
-          <a:p>
-            <a:pPr lvl="1"/>
-            <a:r>
-              <a:rPr lang="en-US" dirty="0" smtClean="0"/>
-              <a:t>BLOB created, updated, or deleted</a:t>
-            </a:r>
-          </a:p>
-          <a:p>
-            <a:endParaRPr lang="en-US" dirty="0" smtClean="0"/>
-          </a:p>
-          <a:p>
-            <a:r>
-              <a:rPr lang="en-US" dirty="0" smtClean="0"/>
-              <a:t>Most often used in consumption mode – only charged for </a:t>
-            </a:r>
-            <a:r>
-              <a:rPr lang="en-US" dirty="0" smtClean="0"/>
-              <a:t>use</a:t>
-            </a:r>
-            <a:endParaRPr lang="en-US" dirty="0" smtClean="0"/>
-          </a:p>
-          <a:p>
-            <a:pPr lvl="1"/>
-            <a:r>
-              <a:rPr lang="en-US" dirty="0" smtClean="0"/>
-              <a:t>Based on number of executions, execution time, and memory </a:t>
-            </a:r>
-            <a:r>
-              <a:rPr lang="en-US" dirty="0" smtClean="0"/>
-              <a:t>used</a:t>
-            </a:r>
-          </a:p>
-          <a:p>
-            <a:pPr lvl="1"/>
-            <a:endParaRPr lang="en-US" dirty="0"/>
-          </a:p>
-          <a:p>
-            <a:r>
-              <a:rPr lang="en-US" dirty="0" smtClean="0"/>
-              <a:t>Does have some limitations when compared to Azure App Services</a:t>
-            </a:r>
-          </a:p>
-          <a:p>
-            <a:pPr lvl="1"/>
-            <a:r>
-              <a:rPr lang="en-US" dirty="0" smtClean="0"/>
-              <a:t>We’ll discuss some of these in a later sprint</a:t>
-            </a:r>
-            <a:endParaRPr lang="en-US" dirty="0" smtClean="0"/>
-          </a:p>
-        </p:txBody>
-      </p:sp>
-    </p:spTree>
-    <p:extLst>
-      <p:ext uri="{BB962C8B-B14F-4D97-AF65-F5344CB8AC3E}">
-        <p14:creationId xmlns:p14="http://schemas.microsoft.com/office/powerpoint/2010/main" val="1071117519"/>
-      </p:ext>
-    </p:extLst>
-  </p:cSld>
-  <p:clrMapOvr>
-    <a:masterClrMapping/>
-  </p:clrMapOvr>
-</p:sld>
-</file>
-
 <file path=ppt/slides/slide7.xml><?xml version="1.0" encoding="utf-8"?>
 <p:sld xmlns:a="http://schemas.openxmlformats.org/drawingml/2006/main" xmlns:r="http://schemas.openxmlformats.org/officeDocument/2006/relationships" xmlns:p="http://schemas.openxmlformats.org/presentationml/2006/main">
   <p:cSld>
@@ -3911,6 +4132,177 @@
           <a:lstStyle/>
           <a:p>
             <a:r>
+              <a:rPr lang="en-US" dirty="0" smtClean="0"/>
+              <a:t>Provider Transfer Service: Azure Function</a:t>
+            </a:r>
+            <a:endParaRPr lang="en-US" dirty="0"/>
+          </a:p>
+        </p:txBody>
+      </p:sp>
+      <p:sp>
+        <p:nvSpPr>
+          <p:cNvPr id="3" name="Content Placeholder 2"/>
+          <p:cNvSpPr>
+            <a:spLocks noGrp="1"/>
+          </p:cNvSpPr>
+          <p:nvPr>
+            <p:ph idx="1"/>
+          </p:nvPr>
+        </p:nvSpPr>
+        <p:spPr/>
+        <p:txBody>
+          <a:bodyPr>
+            <a:normAutofit fontScale="62500" lnSpcReduction="20000"/>
+          </a:bodyPr>
+          <a:lstStyle/>
+          <a:p>
+            <a:r>
+              <a:rPr lang="en-US" dirty="0" smtClean="0"/>
+              <a:t>Azure’s event-driven, </a:t>
+            </a:r>
+            <a:r>
+              <a:rPr lang="en-US" dirty="0" err="1" smtClean="0"/>
+              <a:t>serverless</a:t>
+            </a:r>
+            <a:r>
+              <a:rPr lang="en-US" dirty="0" smtClean="0"/>
+              <a:t> compute option</a:t>
+            </a:r>
+          </a:p>
+          <a:p>
+            <a:endParaRPr lang="en-US" dirty="0" smtClean="0"/>
+          </a:p>
+          <a:p>
+            <a:r>
+              <a:rPr lang="en-US" dirty="0" smtClean="0"/>
+              <a:t>Automatically scales – up to 200 parallel instances</a:t>
+            </a:r>
+          </a:p>
+          <a:p>
+            <a:endParaRPr lang="en-US" dirty="0" smtClean="0"/>
+          </a:p>
+          <a:p>
+            <a:r>
+              <a:rPr lang="en-US" dirty="0" smtClean="0"/>
+              <a:t>Possible triggers</a:t>
+            </a:r>
+          </a:p>
+          <a:p>
+            <a:pPr lvl="1"/>
+            <a:r>
+              <a:rPr lang="en-US" dirty="0" smtClean="0"/>
+              <a:t>HTTP call</a:t>
+            </a:r>
+          </a:p>
+          <a:p>
+            <a:pPr lvl="1"/>
+            <a:r>
+              <a:rPr lang="en-US" dirty="0" smtClean="0"/>
+              <a:t>Timer</a:t>
+            </a:r>
+          </a:p>
+          <a:p>
+            <a:pPr lvl="1"/>
+            <a:r>
+              <a:rPr lang="en-US" dirty="0" smtClean="0"/>
+              <a:t>Message arrived / event occurred</a:t>
+            </a:r>
+          </a:p>
+          <a:p>
+            <a:pPr lvl="1"/>
+            <a:r>
+              <a:rPr lang="en-US" dirty="0" smtClean="0"/>
+              <a:t>Database record created, updated, or deleted</a:t>
+            </a:r>
+          </a:p>
+          <a:p>
+            <a:pPr lvl="1"/>
+            <a:r>
+              <a:rPr lang="en-US" dirty="0" smtClean="0"/>
+              <a:t>BLOB created, updated, or deleted</a:t>
+            </a:r>
+          </a:p>
+          <a:p>
+            <a:endParaRPr lang="en-US" dirty="0" smtClean="0"/>
+          </a:p>
+          <a:p>
+            <a:r>
+              <a:rPr lang="en-US" dirty="0" smtClean="0"/>
+              <a:t>Most often used in consumption mode – only charged for use</a:t>
+            </a:r>
+          </a:p>
+          <a:p>
+            <a:pPr lvl="1"/>
+            <a:r>
+              <a:rPr lang="en-US" dirty="0" smtClean="0"/>
+              <a:t>Based on number of executions, execution time, and memory used</a:t>
+            </a:r>
+          </a:p>
+          <a:p>
+            <a:pPr lvl="1"/>
+            <a:endParaRPr lang="en-US" dirty="0"/>
+          </a:p>
+          <a:p>
+            <a:r>
+              <a:rPr lang="en-US" dirty="0" smtClean="0"/>
+              <a:t>Does have some limitations when compared to Azure App Services</a:t>
+            </a:r>
+          </a:p>
+          <a:p>
+            <a:pPr lvl="1"/>
+            <a:r>
+              <a:rPr lang="en-US" dirty="0" smtClean="0"/>
+              <a:t>We’ll discuss some of these in a later sprint</a:t>
+            </a:r>
+          </a:p>
+        </p:txBody>
+      </p:sp>
+    </p:spTree>
+    <p:extLst>
+      <p:ext uri="{BB962C8B-B14F-4D97-AF65-F5344CB8AC3E}">
+        <p14:creationId xmlns:p14="http://schemas.microsoft.com/office/powerpoint/2010/main" val="1071117519"/>
+      </p:ext>
+    </p:extLst>
+  </p:cSld>
+  <p:clrMapOvr>
+    <a:masterClrMapping/>
+  </p:clrMapOvr>
+</p:sld>
+</file>
+
+<file path=ppt/slides/slide8.xml><?xml version="1.0" encoding="utf-8"?>
+<p:sld xmlns:a="http://schemas.openxmlformats.org/drawingml/2006/main" xmlns:r="http://schemas.openxmlformats.org/officeDocument/2006/relationships" xmlns:p="http://schemas.openxmlformats.org/presentationml/2006/main">
+  <p:cSld>
+    <p:spTree>
+      <p:nvGrpSpPr>
+        <p:cNvPr id="1" name=""/>
+        <p:cNvGrpSpPr/>
+        <p:nvPr/>
+      </p:nvGrpSpPr>
+      <p:grpSpPr>
+        <a:xfrm>
+          <a:off x="0" y="0"/>
+          <a:ext cx="0" cy="0"/>
+          <a:chOff x="0" y="0"/>
+          <a:chExt cx="0" cy="0"/>
+        </a:xfrm>
+      </p:grpSpPr>
+      <p:sp>
+        <p:nvSpPr>
+          <p:cNvPr id="2" name="Title 1"/>
+          <p:cNvSpPr>
+            <a:spLocks noGrp="1"/>
+          </p:cNvSpPr>
+          <p:nvPr>
+            <p:ph type="title"/>
+          </p:nvPr>
+        </p:nvSpPr>
+        <p:spPr/>
+        <p:txBody>
+          <a:bodyPr/>
+          <a:lstStyle/>
+          <a:p>
+            <a:r>
               <a:rPr lang="en-US" dirty="0"/>
               <a:t>T</a:t>
             </a:r>
@@ -3978,13 +4370,8 @@
             <a:pPr lvl="1"/>
             <a:r>
               <a:rPr lang="en-US" dirty="0" smtClean="0"/>
-              <a:t>Pricing tier: Standard so we can have multiple consumer </a:t>
-            </a:r>
-            <a:r>
-              <a:rPr lang="en-US" dirty="0" smtClean="0"/>
-              <a:t>groups</a:t>
-            </a:r>
-            <a:endParaRPr lang="en-US" dirty="0" smtClean="0"/>
+              <a:t>Pricing tier: Standard so we can have multiple consumer groups</a:t>
+            </a:r>
           </a:p>
           <a:p>
             <a:endParaRPr lang="en-US" dirty="0" smtClean="0"/>
@@ -4049,7 +4436,7 @@
 </p:sld>
 </file>
 
-<file path=ppt/slides/slide8.xml><?xml version="1.0" encoding="utf-8"?>
+<file path=ppt/slides/slide9.xml><?xml version="1.0" encoding="utf-8"?>
 <p:sld xmlns:a="http://schemas.openxmlformats.org/drawingml/2006/main" xmlns:r="http://schemas.openxmlformats.org/officeDocument/2006/relationships" xmlns:p="http://schemas.openxmlformats.org/presentationml/2006/main">
   <p:cSld>
     <p:spTree>
@@ -4087,7 +4474,15 @@
             </a:r>
             <a:r>
               <a:rPr lang="en-US" dirty="0" smtClean="0"/>
-              <a:t>ask 1-2: Provider Transfer </a:t>
+              <a:t>ask 1-2: </a:t>
+            </a:r>
+            <a:r>
+              <a:rPr lang="en-US" dirty="0" smtClean="0"/>
+              <a:t>Provider </a:t>
+            </a:r>
+            <a:r>
+              <a:rPr lang="en-US" dirty="0" smtClean="0"/>
+              <a:t>Transfer </a:t>
             </a:r>
             <a:r>
               <a:rPr lang="en-US" dirty="0"/>
@@ -4114,7 +4509,7 @@
         <p:spPr/>
         <p:txBody>
           <a:bodyPr>
-            <a:normAutofit fontScale="92500" lnSpcReduction="20000"/>
+            <a:normAutofit lnSpcReduction="10000"/>
           </a:bodyPr>
           <a:lstStyle/>
           <a:p>
@@ -4153,7 +4548,15 @@
             <a:pPr lvl="1"/>
             <a:r>
               <a:rPr lang="en-US" dirty="0" smtClean="0"/>
-              <a:t>Timer will send 1 or more requests each time it fires</a:t>
+              <a:t>Timer will send </a:t>
+            </a:r>
+            <a:r>
+              <a:rPr lang="en-US" dirty="0" smtClean="0"/>
+              <a:t>a request </a:t>
+            </a:r>
+            <a:r>
+              <a:rPr lang="en-US" dirty="0" smtClean="0"/>
+              <a:t>each time it fires</a:t>
             </a:r>
           </a:p>
           <a:p>
@@ -4191,7 +4594,19 @@
             </a:r>
             <a:r>
               <a:rPr lang="en-US" dirty="0" smtClean="0"/>
-              <a:t>connection string from received request hub</a:t>
+              <a:t>connection string from </a:t>
+            </a:r>
+            <a:r>
+              <a:rPr lang="en-US" dirty="0" err="1" smtClean="0"/>
+              <a:t>receivedrequest</a:t>
+            </a:r>
+            <a:r>
+              <a:rPr lang="en-US" dirty="0" smtClean="0"/>
+              <a:t> </a:t>
+            </a:r>
+            <a:r>
+              <a:rPr lang="en-US" dirty="0" smtClean="0"/>
+              <a:t>hub</a:t>
             </a:r>
           </a:p>
           <a:p>
@@ -4206,18 +4621,13 @@
             </a:r>
             <a:r>
               <a:rPr lang="en-US" dirty="0" smtClean="0"/>
-              <a:t> project in solution</a:t>
-            </a:r>
-          </a:p>
-          <a:p>
+              <a:t> project in </a:t>
+            </a:r>
+            <a:r>
+              <a:rPr lang="en-US" dirty="0" smtClean="0"/>
+              <a:t>solution</a:t>
+            </a:r>
             <a:endParaRPr lang="en-US" dirty="0" smtClean="0"/>
-          </a:p>
-          <a:p>
-            <a:r>
-              <a:rPr lang="en-US" dirty="0" smtClean="0"/>
-              <a:t>Publish to Azure</a:t>
-            </a:r>
-            <a:endParaRPr lang="en-US" dirty="0"/>
           </a:p>
         </p:txBody>
       </p:sp>
@@ -4255,160 +4665,6 @@
     <p:extLst>
       <p:ext uri="{BB962C8B-B14F-4D97-AF65-F5344CB8AC3E}">
         <p14:creationId xmlns:p14="http://schemas.microsoft.com/office/powerpoint/2010/main" val="3702653548"/>
-      </p:ext>
-    </p:extLst>
-  </p:cSld>
-  <p:clrMapOvr>
-    <a:masterClrMapping/>
-  </p:clrMapOvr>
-</p:sld>
-</file>
-
-<file path=ppt/slides/slide9.xml><?xml version="1.0" encoding="utf-8"?>
-<p:sld xmlns:a="http://schemas.openxmlformats.org/drawingml/2006/main" xmlns:r="http://schemas.openxmlformats.org/officeDocument/2006/relationships" xmlns:p="http://schemas.openxmlformats.org/presentationml/2006/main">
-  <p:cSld>
-    <p:spTree>
-      <p:nvGrpSpPr>
-        <p:cNvPr id="1" name=""/>
-        <p:cNvGrpSpPr/>
-        <p:nvPr/>
-      </p:nvGrpSpPr>
-      <p:grpSpPr>
-        <a:xfrm>
-          <a:off x="0" y="0"/>
-          <a:ext cx="0" cy="0"/>
-          <a:chOff x="0" y="0"/>
-          <a:chExt cx="0" cy="0"/>
-        </a:xfrm>
-      </p:grpSpPr>
-      <p:sp>
-        <p:nvSpPr>
-          <p:cNvPr id="2" name="Title 1"/>
-          <p:cNvSpPr>
-            <a:spLocks noGrp="1"/>
-          </p:cNvSpPr>
-          <p:nvPr>
-            <p:ph type="title"/>
-          </p:nvPr>
-        </p:nvSpPr>
-        <p:spPr/>
-        <p:txBody>
-          <a:bodyPr/>
-          <a:lstStyle/>
-          <a:p>
-            <a:r>
-              <a:rPr lang="en-US" dirty="0" smtClean="0"/>
-              <a:t>Sprint 1: Retrospective</a:t>
-            </a:r>
-            <a:endParaRPr lang="en-US" dirty="0"/>
-          </a:p>
-        </p:txBody>
-      </p:sp>
-      <p:sp>
-        <p:nvSpPr>
-          <p:cNvPr id="3" name="Content Placeholder 2"/>
-          <p:cNvSpPr>
-            <a:spLocks noGrp="1"/>
-          </p:cNvSpPr>
-          <p:nvPr>
-            <p:ph idx="1"/>
-          </p:nvPr>
-        </p:nvSpPr>
-        <p:spPr/>
-        <p:txBody>
-          <a:bodyPr>
-            <a:normAutofit lnSpcReduction="10000"/>
-          </a:bodyPr>
-          <a:lstStyle/>
-          <a:p>
-            <a:r>
-              <a:rPr lang="en-US" dirty="0" smtClean="0"/>
-              <a:t>We have the beginning of our utilization management platform</a:t>
-            </a:r>
-          </a:p>
-          <a:p>
-            <a:pPr lvl="1"/>
-            <a:r>
-              <a:rPr lang="en-US" dirty="0" smtClean="0"/>
-              <a:t>Incoming requests are available to any platform components</a:t>
-            </a:r>
-          </a:p>
-          <a:p>
-            <a:endParaRPr lang="en-US" dirty="0" smtClean="0"/>
-          </a:p>
-          <a:p>
-            <a:r>
-              <a:rPr lang="en-US" dirty="0" smtClean="0"/>
-              <a:t>We are taking advantage of asynchronous messaging</a:t>
-            </a:r>
-          </a:p>
-          <a:p>
-            <a:pPr lvl="1"/>
-            <a:r>
-              <a:rPr lang="en-US" dirty="0" smtClean="0"/>
-              <a:t>Publishing requests with little concern for who will consume them or how many consumers there will be</a:t>
-            </a:r>
-          </a:p>
-          <a:p>
-            <a:endParaRPr lang="en-US" dirty="0" smtClean="0"/>
-          </a:p>
-          <a:p>
-            <a:r>
-              <a:rPr lang="en-US" dirty="0" smtClean="0"/>
-              <a:t>Everything about the platform is scalable</a:t>
-            </a:r>
-          </a:p>
-          <a:p>
-            <a:pPr lvl="1"/>
-            <a:endParaRPr lang="en-US" dirty="0" smtClean="0"/>
-          </a:p>
-          <a:p>
-            <a:r>
-              <a:rPr lang="en-US" dirty="0" smtClean="0"/>
-              <a:t>Later exercises will demonstrate asynchronous </a:t>
-            </a:r>
-            <a:r>
-              <a:rPr lang="en-US" dirty="0" smtClean="0"/>
-              <a:t>messaging</a:t>
-            </a:r>
-            <a:endParaRPr lang="en-US" dirty="0" smtClean="0"/>
-          </a:p>
-        </p:txBody>
-      </p:sp>
-      <p:pic>
-        <p:nvPicPr>
-          <p:cNvPr id="4" name="Picture 3"/>
-          <p:cNvPicPr>
-            <a:picLocks noChangeAspect="1"/>
-          </p:cNvPicPr>
-          <p:nvPr/>
-        </p:nvPicPr>
-        <p:blipFill>
-          <a:blip r:embed="rId2" cstate="print">
-            <a:extLst>
-              <a:ext uri="{28A0092B-C50C-407E-A947-70E740481C1C}">
-                <a14:useLocalDpi xmlns:a14="http://schemas.microsoft.com/office/drawing/2010/main" val="0"/>
-              </a:ext>
-            </a:extLst>
-          </a:blip>
-          <a:stretch>
-            <a:fillRect/>
-          </a:stretch>
-        </p:blipFill>
-        <p:spPr>
-          <a:xfrm>
-            <a:off x="9135291" y="292047"/>
-            <a:ext cx="2455817" cy="1381224"/>
-          </a:xfrm>
-          <a:prstGeom prst="rect">
-            <a:avLst/>
-          </a:prstGeom>
-        </p:spPr>
-      </p:pic>
-    </p:spTree>
-    <p:extLst>
-      <p:ext uri="{BB962C8B-B14F-4D97-AF65-F5344CB8AC3E}">
-        <p14:creationId xmlns:p14="http://schemas.microsoft.com/office/powerpoint/2010/main" val="1524408480"/>
       </p:ext>
     </p:extLst>
   </p:cSld>

</xml_diff>